<commit_message>
chanfe library ant to MUI
</commit_message>
<xml_diff>
--- a/Presentation project Tea.pptx
+++ b/Presentation project Tea.pptx
@@ -10,7 +10,9 @@
     <p:sldId id="262" r:id="rId4"/>
     <p:sldId id="259" r:id="rId5"/>
     <p:sldId id="260" r:id="rId6"/>
-    <p:sldId id="261" r:id="rId7"/>
+    <p:sldId id="263" r:id="rId7"/>
+    <p:sldId id="264" r:id="rId8"/>
+    <p:sldId id="261" r:id="rId9"/>
   </p:sldIdLst>
   <p:sldSz cx="12192000" cy="6858000"/>
   <p:notesSz cx="6858000" cy="9144000"/>
@@ -248,7 +250,7 @@
           <a:p>
             <a:fld id="{EB62A007-84BE-46DD-8233-8EF26D90EDAA}" type="datetimeFigureOut">
               <a:rPr lang="ru-RU" smtClean="0"/>
-              <a:t>26.08.2024</a:t>
+              <a:t>27.08.2024</a:t>
             </a:fld>
             <a:endParaRPr lang="ru-RU"/>
           </a:p>
@@ -418,7 +420,7 @@
           <a:p>
             <a:fld id="{EB62A007-84BE-46DD-8233-8EF26D90EDAA}" type="datetimeFigureOut">
               <a:rPr lang="ru-RU" smtClean="0"/>
-              <a:t>26.08.2024</a:t>
+              <a:t>27.08.2024</a:t>
             </a:fld>
             <a:endParaRPr lang="ru-RU"/>
           </a:p>
@@ -598,7 +600,7 @@
           <a:p>
             <a:fld id="{EB62A007-84BE-46DD-8233-8EF26D90EDAA}" type="datetimeFigureOut">
               <a:rPr lang="ru-RU" smtClean="0"/>
-              <a:t>26.08.2024</a:t>
+              <a:t>27.08.2024</a:t>
             </a:fld>
             <a:endParaRPr lang="ru-RU"/>
           </a:p>
@@ -768,7 +770,7 @@
           <a:p>
             <a:fld id="{EB62A007-84BE-46DD-8233-8EF26D90EDAA}" type="datetimeFigureOut">
               <a:rPr lang="ru-RU" smtClean="0"/>
-              <a:t>26.08.2024</a:t>
+              <a:t>27.08.2024</a:t>
             </a:fld>
             <a:endParaRPr lang="ru-RU"/>
           </a:p>
@@ -1014,7 +1016,7 @@
           <a:p>
             <a:fld id="{EB62A007-84BE-46DD-8233-8EF26D90EDAA}" type="datetimeFigureOut">
               <a:rPr lang="ru-RU" smtClean="0"/>
-              <a:t>26.08.2024</a:t>
+              <a:t>27.08.2024</a:t>
             </a:fld>
             <a:endParaRPr lang="ru-RU"/>
           </a:p>
@@ -1246,7 +1248,7 @@
           <a:p>
             <a:fld id="{EB62A007-84BE-46DD-8233-8EF26D90EDAA}" type="datetimeFigureOut">
               <a:rPr lang="ru-RU" smtClean="0"/>
-              <a:t>26.08.2024</a:t>
+              <a:t>27.08.2024</a:t>
             </a:fld>
             <a:endParaRPr lang="ru-RU"/>
           </a:p>
@@ -1613,7 +1615,7 @@
           <a:p>
             <a:fld id="{EB62A007-84BE-46DD-8233-8EF26D90EDAA}" type="datetimeFigureOut">
               <a:rPr lang="ru-RU" smtClean="0"/>
-              <a:t>26.08.2024</a:t>
+              <a:t>27.08.2024</a:t>
             </a:fld>
             <a:endParaRPr lang="ru-RU"/>
           </a:p>
@@ -1731,7 +1733,7 @@
           <a:p>
             <a:fld id="{EB62A007-84BE-46DD-8233-8EF26D90EDAA}" type="datetimeFigureOut">
               <a:rPr lang="ru-RU" smtClean="0"/>
-              <a:t>26.08.2024</a:t>
+              <a:t>27.08.2024</a:t>
             </a:fld>
             <a:endParaRPr lang="ru-RU"/>
           </a:p>
@@ -1826,7 +1828,7 @@
           <a:p>
             <a:fld id="{EB62A007-84BE-46DD-8233-8EF26D90EDAA}" type="datetimeFigureOut">
               <a:rPr lang="ru-RU" smtClean="0"/>
-              <a:t>26.08.2024</a:t>
+              <a:t>27.08.2024</a:t>
             </a:fld>
             <a:endParaRPr lang="ru-RU"/>
           </a:p>
@@ -2103,7 +2105,7 @@
           <a:p>
             <a:fld id="{EB62A007-84BE-46DD-8233-8EF26D90EDAA}" type="datetimeFigureOut">
               <a:rPr lang="ru-RU" smtClean="0"/>
-              <a:t>26.08.2024</a:t>
+              <a:t>27.08.2024</a:t>
             </a:fld>
             <a:endParaRPr lang="ru-RU"/>
           </a:p>
@@ -2356,7 +2358,7 @@
           <a:p>
             <a:fld id="{EB62A007-84BE-46DD-8233-8EF26D90EDAA}" type="datetimeFigureOut">
               <a:rPr lang="ru-RU" smtClean="0"/>
-              <a:t>26.08.2024</a:t>
+              <a:t>27.08.2024</a:t>
             </a:fld>
             <a:endParaRPr lang="ru-RU"/>
           </a:p>
@@ -2569,7 +2571,7 @@
           <a:p>
             <a:fld id="{EB62A007-84BE-46DD-8233-8EF26D90EDAA}" type="datetimeFigureOut">
               <a:rPr lang="ru-RU" smtClean="0"/>
-              <a:t>26.08.2024</a:t>
+              <a:t>27.08.2024</a:t>
             </a:fld>
             <a:endParaRPr lang="ru-RU"/>
           </a:p>
@@ -7399,6 +7401,631 @@
 </file>
 
 <file path=ppt/slides/slide6.xml><?xml version="1.0" encoding="utf-8"?>
+<p:sld xmlns:a="http://schemas.openxmlformats.org/drawingml/2006/main" xmlns:r="http://schemas.openxmlformats.org/officeDocument/2006/relationships" xmlns:p="http://schemas.openxmlformats.org/presentationml/2006/main">
+  <p:cSld>
+    <p:spTree>
+      <p:nvGrpSpPr>
+        <p:cNvPr id="1" name=""/>
+        <p:cNvGrpSpPr/>
+        <p:nvPr/>
+      </p:nvGrpSpPr>
+      <p:grpSpPr>
+        <a:xfrm>
+          <a:off x="0" y="0"/>
+          <a:ext cx="0" cy="0"/>
+          <a:chOff x="0" y="0"/>
+          <a:chExt cx="0" cy="0"/>
+        </a:xfrm>
+      </p:grpSpPr>
+      <p:sp>
+        <p:nvSpPr>
+          <p:cNvPr id="2" name="Заголовок 1"/>
+          <p:cNvSpPr>
+            <a:spLocks noGrp="1"/>
+          </p:cNvSpPr>
+          <p:nvPr>
+            <p:ph type="title"/>
+          </p:nvPr>
+        </p:nvSpPr>
+        <p:spPr>
+          <a:xfrm>
+            <a:off x="838200" y="3056567"/>
+            <a:ext cx="10515600" cy="1325563"/>
+          </a:xfrm>
+        </p:spPr>
+        <p:txBody>
+          <a:bodyPr/>
+          <a:lstStyle/>
+          <a:p>
+            <a:pPr algn="ctr"/>
+            <a:r>
+              <a:rPr lang="en-US" dirty="0" smtClean="0"/>
+              <a:t>ADMINE</a:t>
+            </a:r>
+            <a:endParaRPr lang="ru-RU" dirty="0"/>
+          </a:p>
+        </p:txBody>
+      </p:sp>
+    </p:spTree>
+    <p:extLst>
+      <p:ext uri="{BB962C8B-B14F-4D97-AF65-F5344CB8AC3E}">
+        <p14:creationId xmlns:p14="http://schemas.microsoft.com/office/powerpoint/2010/main" val="20446796"/>
+      </p:ext>
+    </p:extLst>
+  </p:cSld>
+  <p:clrMapOvr>
+    <a:masterClrMapping/>
+  </p:clrMapOvr>
+</p:sld>
+</file>
+
+<file path=ppt/slides/slide7.xml><?xml version="1.0" encoding="utf-8"?>
+<p:sld xmlns:a="http://schemas.openxmlformats.org/drawingml/2006/main" xmlns:r="http://schemas.openxmlformats.org/officeDocument/2006/relationships" xmlns:p="http://schemas.openxmlformats.org/presentationml/2006/main">
+  <p:cSld>
+    <p:bg>
+      <p:bgPr>
+        <a:gradFill>
+          <a:gsLst>
+            <a:gs pos="0">
+              <a:schemeClr val="accent1">
+                <a:lumMod val="5000"/>
+                <a:lumOff val="95000"/>
+              </a:schemeClr>
+            </a:gs>
+            <a:gs pos="45000">
+              <a:srgbClr val="7030A0">
+                <a:alpha val="68000"/>
+                <a:lumMod val="93000"/>
+              </a:srgbClr>
+            </a:gs>
+            <a:gs pos="83000">
+              <a:schemeClr val="accent1">
+                <a:lumMod val="45000"/>
+                <a:lumOff val="55000"/>
+              </a:schemeClr>
+            </a:gs>
+            <a:gs pos="100000">
+              <a:schemeClr val="accent1">
+                <a:lumMod val="30000"/>
+                <a:lumOff val="70000"/>
+              </a:schemeClr>
+            </a:gs>
+          </a:gsLst>
+          <a:path path="circle">
+            <a:fillToRect l="100000" t="100000"/>
+          </a:path>
+        </a:gradFill>
+        <a:effectLst/>
+      </p:bgPr>
+    </p:bg>
+    <p:spTree>
+      <p:nvGrpSpPr>
+        <p:cNvPr id="1" name=""/>
+        <p:cNvGrpSpPr/>
+        <p:nvPr/>
+      </p:nvGrpSpPr>
+      <p:grpSpPr>
+        <a:xfrm>
+          <a:off x="0" y="0"/>
+          <a:ext cx="0" cy="0"/>
+          <a:chOff x="0" y="0"/>
+          <a:chExt cx="0" cy="0"/>
+        </a:xfrm>
+      </p:grpSpPr>
+      <p:sp>
+        <p:nvSpPr>
+          <p:cNvPr id="4" name="Скругленный прямоугольник 3"/>
+          <p:cNvSpPr/>
+          <p:nvPr/>
+        </p:nvSpPr>
+        <p:spPr>
+          <a:xfrm>
+            <a:off x="429021" y="200748"/>
+            <a:ext cx="1829330" cy="507527"/>
+          </a:xfrm>
+          <a:prstGeom prst="roundRect">
+            <a:avLst/>
+          </a:prstGeom>
+          <a:solidFill>
+            <a:srgbClr val="002060"/>
+          </a:solidFill>
+          <a:ln>
+            <a:noFill/>
+          </a:ln>
+        </p:spPr>
+        <p:style>
+          <a:lnRef idx="2">
+            <a:schemeClr val="accent1">
+              <a:shade val="50000"/>
+            </a:schemeClr>
+          </a:lnRef>
+          <a:fillRef idx="1">
+            <a:schemeClr val="accent1"/>
+          </a:fillRef>
+          <a:effectRef idx="0">
+            <a:schemeClr val="accent1"/>
+          </a:effectRef>
+          <a:fontRef idx="minor">
+            <a:schemeClr val="lt1"/>
+          </a:fontRef>
+        </p:style>
+        <p:txBody>
+          <a:bodyPr rtlCol="0" anchor="ctr"/>
+          <a:lstStyle/>
+          <a:p>
+            <a:pPr algn="ctr"/>
+            <a:r>
+              <a:rPr lang="en-US" dirty="0" smtClean="0"/>
+              <a:t>Admin UI</a:t>
+            </a:r>
+            <a:endParaRPr lang="ru-RU" dirty="0"/>
+          </a:p>
+        </p:txBody>
+      </p:sp>
+      <p:sp>
+        <p:nvSpPr>
+          <p:cNvPr id="7" name="Скругленный прямоугольник 6"/>
+          <p:cNvSpPr/>
+          <p:nvPr/>
+        </p:nvSpPr>
+        <p:spPr>
+          <a:xfrm>
+            <a:off x="10035971" y="200747"/>
+            <a:ext cx="1829330" cy="507527"/>
+          </a:xfrm>
+          <a:prstGeom prst="roundRect">
+            <a:avLst/>
+          </a:prstGeom>
+          <a:solidFill>
+            <a:srgbClr val="002060"/>
+          </a:solidFill>
+          <a:ln>
+            <a:noFill/>
+          </a:ln>
+        </p:spPr>
+        <p:style>
+          <a:lnRef idx="2">
+            <a:schemeClr val="accent1">
+              <a:shade val="50000"/>
+            </a:schemeClr>
+          </a:lnRef>
+          <a:fillRef idx="1">
+            <a:schemeClr val="accent1"/>
+          </a:fillRef>
+          <a:effectRef idx="0">
+            <a:schemeClr val="accent1"/>
+          </a:effectRef>
+          <a:fontRef idx="minor">
+            <a:schemeClr val="lt1"/>
+          </a:fontRef>
+        </p:style>
+        <p:txBody>
+          <a:bodyPr rtlCol="0" anchor="ctr"/>
+          <a:lstStyle/>
+          <a:p>
+            <a:pPr algn="ctr"/>
+            <a:r>
+              <a:rPr lang="en-US" dirty="0" smtClean="0"/>
+              <a:t>Logout</a:t>
+            </a:r>
+            <a:endParaRPr lang="ru-RU" dirty="0"/>
+          </a:p>
+        </p:txBody>
+      </p:sp>
+      <p:sp>
+        <p:nvSpPr>
+          <p:cNvPr id="8" name="Скругленный прямоугольник 7"/>
+          <p:cNvSpPr/>
+          <p:nvPr/>
+        </p:nvSpPr>
+        <p:spPr>
+          <a:xfrm>
+            <a:off x="429020" y="1211049"/>
+            <a:ext cx="1995003" cy="507527"/>
+          </a:xfrm>
+          <a:prstGeom prst="roundRect">
+            <a:avLst/>
+          </a:prstGeom>
+          <a:solidFill>
+            <a:srgbClr val="002060"/>
+          </a:solidFill>
+          <a:ln>
+            <a:noFill/>
+          </a:ln>
+        </p:spPr>
+        <p:style>
+          <a:lnRef idx="2">
+            <a:schemeClr val="accent1">
+              <a:shade val="50000"/>
+            </a:schemeClr>
+          </a:lnRef>
+          <a:fillRef idx="1">
+            <a:schemeClr val="accent1"/>
+          </a:fillRef>
+          <a:effectRef idx="0">
+            <a:schemeClr val="accent1"/>
+          </a:effectRef>
+          <a:fontRef idx="minor">
+            <a:schemeClr val="lt1"/>
+          </a:fontRef>
+        </p:style>
+        <p:txBody>
+          <a:bodyPr rtlCol="0" anchor="ctr"/>
+          <a:lstStyle/>
+          <a:p>
+            <a:pPr algn="ctr"/>
+            <a:r>
+              <a:rPr lang="en-US" dirty="0" smtClean="0"/>
+              <a:t>Create New Item</a:t>
+            </a:r>
+            <a:endParaRPr lang="ru-RU" dirty="0"/>
+          </a:p>
+        </p:txBody>
+      </p:sp>
+      <p:sp>
+        <p:nvSpPr>
+          <p:cNvPr id="9" name="Скругленный прямоугольник 8"/>
+          <p:cNvSpPr/>
+          <p:nvPr/>
+        </p:nvSpPr>
+        <p:spPr>
+          <a:xfrm>
+            <a:off x="429020" y="2573114"/>
+            <a:ext cx="1995003" cy="541022"/>
+          </a:xfrm>
+          <a:prstGeom prst="roundRect">
+            <a:avLst/>
+          </a:prstGeom>
+          <a:solidFill>
+            <a:srgbClr val="002060"/>
+          </a:solidFill>
+          <a:ln>
+            <a:noFill/>
+          </a:ln>
+        </p:spPr>
+        <p:style>
+          <a:lnRef idx="2">
+            <a:schemeClr val="accent1">
+              <a:shade val="50000"/>
+            </a:schemeClr>
+          </a:lnRef>
+          <a:fillRef idx="1">
+            <a:schemeClr val="accent1"/>
+          </a:fillRef>
+          <a:effectRef idx="0">
+            <a:schemeClr val="accent1"/>
+          </a:effectRef>
+          <a:fontRef idx="minor">
+            <a:schemeClr val="lt1"/>
+          </a:fontRef>
+        </p:style>
+        <p:txBody>
+          <a:bodyPr rtlCol="0" anchor="ctr"/>
+          <a:lstStyle/>
+          <a:p>
+            <a:pPr algn="ctr"/>
+            <a:r>
+              <a:rPr lang="en-US" dirty="0" smtClean="0"/>
+              <a:t>Get all Item</a:t>
+            </a:r>
+            <a:endParaRPr lang="ru-RU" dirty="0"/>
+          </a:p>
+        </p:txBody>
+      </p:sp>
+      <p:sp>
+        <p:nvSpPr>
+          <p:cNvPr id="10" name="Скругленный прямоугольник 9"/>
+          <p:cNvSpPr/>
+          <p:nvPr/>
+        </p:nvSpPr>
+        <p:spPr>
+          <a:xfrm>
+            <a:off x="429020" y="3342784"/>
+            <a:ext cx="1995003" cy="541022"/>
+          </a:xfrm>
+          <a:prstGeom prst="roundRect">
+            <a:avLst/>
+          </a:prstGeom>
+          <a:solidFill>
+            <a:srgbClr val="002060"/>
+          </a:solidFill>
+          <a:ln>
+            <a:noFill/>
+          </a:ln>
+        </p:spPr>
+        <p:style>
+          <a:lnRef idx="2">
+            <a:schemeClr val="accent1">
+              <a:shade val="50000"/>
+            </a:schemeClr>
+          </a:lnRef>
+          <a:fillRef idx="1">
+            <a:schemeClr val="accent1"/>
+          </a:fillRef>
+          <a:effectRef idx="0">
+            <a:schemeClr val="accent1"/>
+          </a:effectRef>
+          <a:fontRef idx="minor">
+            <a:schemeClr val="lt1"/>
+          </a:fontRef>
+        </p:style>
+        <p:txBody>
+          <a:bodyPr rtlCol="0" anchor="ctr"/>
+          <a:lstStyle/>
+          <a:p>
+            <a:pPr algn="ctr"/>
+            <a:r>
+              <a:rPr lang="en-US" dirty="0" smtClean="0"/>
+              <a:t>Statistic data</a:t>
+            </a:r>
+            <a:endParaRPr lang="ru-RU" dirty="0"/>
+          </a:p>
+        </p:txBody>
+      </p:sp>
+      <p:sp>
+        <p:nvSpPr>
+          <p:cNvPr id="11" name="Скругленный прямоугольник 10"/>
+          <p:cNvSpPr/>
+          <p:nvPr/>
+        </p:nvSpPr>
+        <p:spPr>
+          <a:xfrm>
+            <a:off x="429019" y="1892081"/>
+            <a:ext cx="1995003" cy="507527"/>
+          </a:xfrm>
+          <a:prstGeom prst="roundRect">
+            <a:avLst/>
+          </a:prstGeom>
+          <a:solidFill>
+            <a:srgbClr val="002060"/>
+          </a:solidFill>
+          <a:ln>
+            <a:noFill/>
+          </a:ln>
+        </p:spPr>
+        <p:style>
+          <a:lnRef idx="2">
+            <a:schemeClr val="accent1">
+              <a:shade val="50000"/>
+            </a:schemeClr>
+          </a:lnRef>
+          <a:fillRef idx="1">
+            <a:schemeClr val="accent1"/>
+          </a:fillRef>
+          <a:effectRef idx="0">
+            <a:schemeClr val="accent1"/>
+          </a:effectRef>
+          <a:fontRef idx="minor">
+            <a:schemeClr val="lt1"/>
+          </a:fontRef>
+        </p:style>
+        <p:txBody>
+          <a:bodyPr rtlCol="0" anchor="ctr"/>
+          <a:lstStyle/>
+          <a:p>
+            <a:pPr algn="ctr"/>
+            <a:r>
+              <a:rPr lang="en-US" dirty="0" smtClean="0"/>
+              <a:t>Ingredients</a:t>
+            </a:r>
+            <a:endParaRPr lang="ru-RU" dirty="0"/>
+          </a:p>
+        </p:txBody>
+      </p:sp>
+      <p:sp>
+        <p:nvSpPr>
+          <p:cNvPr id="12" name="Скругленный прямоугольник 11"/>
+          <p:cNvSpPr/>
+          <p:nvPr/>
+        </p:nvSpPr>
+        <p:spPr>
+          <a:xfrm>
+            <a:off x="2565496" y="3342784"/>
+            <a:ext cx="2480957" cy="541022"/>
+          </a:xfrm>
+          <a:prstGeom prst="roundRect">
+            <a:avLst/>
+          </a:prstGeom>
+          <a:solidFill>
+            <a:srgbClr val="002060"/>
+          </a:solidFill>
+          <a:ln>
+            <a:noFill/>
+          </a:ln>
+        </p:spPr>
+        <p:style>
+          <a:lnRef idx="2">
+            <a:schemeClr val="accent1">
+              <a:shade val="50000"/>
+            </a:schemeClr>
+          </a:lnRef>
+          <a:fillRef idx="1">
+            <a:schemeClr val="accent1"/>
+          </a:fillRef>
+          <a:effectRef idx="0">
+            <a:schemeClr val="accent1"/>
+          </a:effectRef>
+          <a:fontRef idx="minor">
+            <a:schemeClr val="lt1"/>
+          </a:fontRef>
+        </p:style>
+        <p:txBody>
+          <a:bodyPr rtlCol="0" anchor="ctr"/>
+          <a:lstStyle/>
+          <a:p>
+            <a:pPr algn="ctr"/>
+            <a:r>
+              <a:rPr lang="en-US" dirty="0" smtClean="0"/>
+              <a:t>Which items get likes</a:t>
+            </a:r>
+            <a:endParaRPr lang="ru-RU" dirty="0"/>
+          </a:p>
+        </p:txBody>
+      </p:sp>
+      <p:sp>
+        <p:nvSpPr>
+          <p:cNvPr id="13" name="Скругленный прямоугольник 12"/>
+          <p:cNvSpPr/>
+          <p:nvPr/>
+        </p:nvSpPr>
+        <p:spPr>
+          <a:xfrm>
+            <a:off x="2565496" y="4021395"/>
+            <a:ext cx="2480957" cy="541022"/>
+          </a:xfrm>
+          <a:prstGeom prst="roundRect">
+            <a:avLst/>
+          </a:prstGeom>
+          <a:solidFill>
+            <a:srgbClr val="002060"/>
+          </a:solidFill>
+          <a:ln>
+            <a:noFill/>
+          </a:ln>
+        </p:spPr>
+        <p:style>
+          <a:lnRef idx="2">
+            <a:schemeClr val="accent1">
+              <a:shade val="50000"/>
+            </a:schemeClr>
+          </a:lnRef>
+          <a:fillRef idx="1">
+            <a:schemeClr val="accent1"/>
+          </a:fillRef>
+          <a:effectRef idx="0">
+            <a:schemeClr val="accent1"/>
+          </a:effectRef>
+          <a:fontRef idx="minor">
+            <a:schemeClr val="lt1"/>
+          </a:fontRef>
+        </p:style>
+        <p:txBody>
+          <a:bodyPr rtlCol="0" anchor="ctr"/>
+          <a:lstStyle/>
+          <a:p>
+            <a:pPr algn="ctr"/>
+            <a:r>
+              <a:rPr lang="en-US" dirty="0" smtClean="0"/>
+              <a:t>Which items go to bin</a:t>
+            </a:r>
+            <a:endParaRPr lang="ru-RU" dirty="0"/>
+          </a:p>
+        </p:txBody>
+      </p:sp>
+      <p:sp>
+        <p:nvSpPr>
+          <p:cNvPr id="14" name="Скругленный прямоугольник 13"/>
+          <p:cNvSpPr/>
+          <p:nvPr/>
+        </p:nvSpPr>
+        <p:spPr>
+          <a:xfrm>
+            <a:off x="2565496" y="4733121"/>
+            <a:ext cx="2480957" cy="541022"/>
+          </a:xfrm>
+          <a:prstGeom prst="roundRect">
+            <a:avLst/>
+          </a:prstGeom>
+          <a:solidFill>
+            <a:srgbClr val="002060"/>
+          </a:solidFill>
+          <a:ln>
+            <a:noFill/>
+          </a:ln>
+        </p:spPr>
+        <p:style>
+          <a:lnRef idx="2">
+            <a:schemeClr val="accent1">
+              <a:shade val="50000"/>
+            </a:schemeClr>
+          </a:lnRef>
+          <a:fillRef idx="1">
+            <a:schemeClr val="accent1"/>
+          </a:fillRef>
+          <a:effectRef idx="0">
+            <a:schemeClr val="accent1"/>
+          </a:effectRef>
+          <a:fontRef idx="minor">
+            <a:schemeClr val="lt1"/>
+          </a:fontRef>
+        </p:style>
+        <p:txBody>
+          <a:bodyPr rtlCol="0" anchor="ctr"/>
+          <a:lstStyle/>
+          <a:p>
+            <a:pPr algn="ctr"/>
+            <a:r>
+              <a:rPr lang="en-US" dirty="0" smtClean="0"/>
+              <a:t>Registered Users</a:t>
+            </a:r>
+            <a:endParaRPr lang="ru-RU" dirty="0"/>
+          </a:p>
+        </p:txBody>
+      </p:sp>
+      <p:sp>
+        <p:nvSpPr>
+          <p:cNvPr id="15" name="Скругленный прямоугольник 14"/>
+          <p:cNvSpPr/>
+          <p:nvPr/>
+        </p:nvSpPr>
+        <p:spPr>
+          <a:xfrm>
+            <a:off x="432444" y="5746678"/>
+            <a:ext cx="1995003" cy="541022"/>
+          </a:xfrm>
+          <a:prstGeom prst="roundRect">
+            <a:avLst/>
+          </a:prstGeom>
+          <a:solidFill>
+            <a:srgbClr val="002060"/>
+          </a:solidFill>
+          <a:ln>
+            <a:noFill/>
+          </a:ln>
+        </p:spPr>
+        <p:style>
+          <a:lnRef idx="2">
+            <a:schemeClr val="accent1">
+              <a:shade val="50000"/>
+            </a:schemeClr>
+          </a:lnRef>
+          <a:fillRef idx="1">
+            <a:schemeClr val="accent1"/>
+          </a:fillRef>
+          <a:effectRef idx="0">
+            <a:schemeClr val="accent1"/>
+          </a:effectRef>
+          <a:fontRef idx="minor">
+            <a:schemeClr val="lt1"/>
+          </a:fontRef>
+        </p:style>
+        <p:txBody>
+          <a:bodyPr rtlCol="0" anchor="ctr"/>
+          <a:lstStyle/>
+          <a:p>
+            <a:pPr algn="ctr"/>
+            <a:r>
+              <a:rPr lang="en-US" dirty="0" smtClean="0"/>
+              <a:t>Errors</a:t>
+            </a:r>
+            <a:endParaRPr lang="ru-RU" dirty="0"/>
+          </a:p>
+        </p:txBody>
+      </p:sp>
+    </p:spTree>
+    <p:extLst>
+      <p:ext uri="{BB962C8B-B14F-4D97-AF65-F5344CB8AC3E}">
+        <p14:creationId xmlns:p14="http://schemas.microsoft.com/office/powerpoint/2010/main" val="860982441"/>
+      </p:ext>
+    </p:extLst>
+  </p:cSld>
+  <p:clrMapOvr>
+    <a:masterClrMapping/>
+  </p:clrMapOvr>
+</p:sld>
+</file>
+
+<file path=ppt/slides/slide8.xml><?xml version="1.0" encoding="utf-8"?>
 <p:sld xmlns:a="http://schemas.openxmlformats.org/drawingml/2006/main" xmlns:r="http://schemas.openxmlformats.org/officeDocument/2006/relationships" xmlns:p="http://schemas.openxmlformats.org/presentationml/2006/main">
   <p:cSld>
     <p:bg>

</xml_diff>

<commit_message>
home page horizontal navbar
</commit_message>
<xml_diff>
--- a/Presentation project Tea.pptx
+++ b/Presentation project Tea.pptx
@@ -6980,6 +6980,76 @@
           </a:p>
         </p:txBody>
       </p:sp>
+      <p:sp>
+        <p:nvSpPr>
+          <p:cNvPr id="51" name="Скругленный прямоугольник 50"/>
+          <p:cNvSpPr/>
+          <p:nvPr/>
+        </p:nvSpPr>
+        <p:spPr>
+          <a:xfrm>
+            <a:off x="3897888" y="4771536"/>
+            <a:ext cx="2393507" cy="1006495"/>
+          </a:xfrm>
+          <a:prstGeom prst="roundRect">
+            <a:avLst/>
+          </a:prstGeom>
+          <a:gradFill flip="none" rotWithShape="1">
+            <a:gsLst>
+              <a:gs pos="69000">
+                <a:srgbClr val="002060"/>
+              </a:gs>
+              <a:gs pos="97000">
+                <a:schemeClr val="accent1">
+                  <a:lumMod val="45000"/>
+                  <a:lumOff val="55000"/>
+                </a:schemeClr>
+              </a:gs>
+              <a:gs pos="100000">
+                <a:schemeClr val="accent1">
+                  <a:lumMod val="30000"/>
+                  <a:lumOff val="70000"/>
+                </a:schemeClr>
+              </a:gs>
+            </a:gsLst>
+            <a:path path="shape">
+              <a:fillToRect l="50000" t="50000" r="50000" b="50000"/>
+            </a:path>
+            <a:tileRect/>
+          </a:gradFill>
+          <a:ln>
+            <a:noFill/>
+          </a:ln>
+        </p:spPr>
+        <p:style>
+          <a:lnRef idx="2">
+            <a:schemeClr val="accent1">
+              <a:shade val="50000"/>
+            </a:schemeClr>
+          </a:lnRef>
+          <a:fillRef idx="1">
+            <a:schemeClr val="accent1"/>
+          </a:fillRef>
+          <a:effectRef idx="0">
+            <a:schemeClr val="accent1"/>
+          </a:effectRef>
+          <a:fontRef idx="minor">
+            <a:schemeClr val="lt1"/>
+          </a:fontRef>
+        </p:style>
+        <p:txBody>
+          <a:bodyPr rtlCol="0" anchor="ctr"/>
+          <a:lstStyle/>
+          <a:p>
+            <a:pPr algn="ctr"/>
+            <a:r>
+              <a:rPr lang="he-IL" dirty="0" smtClean="0"/>
+              <a:t>נגישות</a:t>
+            </a:r>
+            <a:endParaRPr lang="ru-RU" dirty="0"/>
+          </a:p>
+        </p:txBody>
+      </p:sp>
     </p:spTree>
     <p:extLst>
       <p:ext uri="{BB962C8B-B14F-4D97-AF65-F5344CB8AC3E}">
@@ -8673,14 +8743,14 @@
           <p:nvPr>
             <p:extLst>
               <p:ext uri="{D42A27DB-BD31-4B8C-83A1-F6EECF244321}">
-                <p14:modId xmlns:p14="http://schemas.microsoft.com/office/powerpoint/2010/main" val="3679064101"/>
+                <p14:modId xmlns:p14="http://schemas.microsoft.com/office/powerpoint/2010/main" val="2195339737"/>
               </p:ext>
             </p:extLst>
           </p:nvPr>
         </p:nvGraphicFramePr>
         <p:xfrm>
           <a:off x="182880" y="1552786"/>
-          <a:ext cx="2377440" cy="2634408"/>
+          <a:ext cx="2377440" cy="3376512"/>
         </p:xfrm>
         <a:graphic>
           <a:graphicData uri="http://schemas.openxmlformats.org/drawingml/2006/table">
@@ -8708,7 +8778,7 @@
                     <a:bodyPr/>
                     <a:lstStyle/>
                     <a:p>
-                      <a:endParaRPr lang="ru-RU"/>
+                      <a:endParaRPr lang="ru-RU" dirty="0"/>
                     </a:p>
                   </a:txBody>
                   <a:tcPr/>
@@ -8822,7 +8892,7 @@
                   <a:tcPr/>
                 </a:tc>
               </a:tr>
-              <a:tr h="376344">
+              <a:tr h="0">
                 <a:tc>
                   <a:txBody>
                     <a:bodyPr/>
@@ -8900,7 +8970,93 @@
                       </a:pPr>
                       <a:r>
                         <a:rPr lang="en-US" dirty="0" smtClean="0"/>
-                        <a:t>Allergy</a:t>
+                        <a:t>Allergies</a:t>
+                      </a:r>
+                      <a:endParaRPr lang="ru-RU" dirty="0" smtClean="0"/>
+                    </a:p>
+                  </a:txBody>
+                  <a:tcPr/>
+                </a:tc>
+              </a:tr>
+              <a:tr h="376344">
+                <a:tc>
+                  <a:txBody>
+                    <a:bodyPr/>
+                    <a:lstStyle/>
+                    <a:p>
+                      <a:endParaRPr lang="ru-RU" dirty="0"/>
+                    </a:p>
+                  </a:txBody>
+                  <a:tcPr/>
+                </a:tc>
+                <a:tc>
+                  <a:txBody>
+                    <a:bodyPr/>
+                    <a:lstStyle/>
+                    <a:p>
+                      <a:pPr marL="0" marR="0" indent="0" algn="l" defTabSz="914400" rtl="0" eaLnBrk="1" fontAlgn="auto" latinLnBrk="0" hangingPunct="1">
+                        <a:lnSpc>
+                          <a:spcPct val="100000"/>
+                        </a:lnSpc>
+                        <a:spcBef>
+                          <a:spcPts val="0"/>
+                        </a:spcBef>
+                        <a:spcAft>
+                          <a:spcPts val="0"/>
+                        </a:spcAft>
+                        <a:buClrTx/>
+                        <a:buSzTx/>
+                        <a:buFontTx/>
+                        <a:buNone/>
+                        <a:tabLst/>
+                        <a:defRPr/>
+                      </a:pPr>
+                      <a:r>
+                        <a:rPr lang="en-US" dirty="0" smtClean="0"/>
+                        <a:t>Name</a:t>
+                      </a:r>
+                      <a:endParaRPr lang="ru-RU" dirty="0" smtClean="0"/>
+                    </a:p>
+                  </a:txBody>
+                  <a:tcPr/>
+                </a:tc>
+              </a:tr>
+              <a:tr h="376344">
+                <a:tc>
+                  <a:txBody>
+                    <a:bodyPr/>
+                    <a:lstStyle/>
+                    <a:p>
+                      <a:endParaRPr lang="ru-RU" dirty="0"/>
+                    </a:p>
+                  </a:txBody>
+                  <a:tcPr/>
+                </a:tc>
+                <a:tc>
+                  <a:txBody>
+                    <a:bodyPr/>
+                    <a:lstStyle/>
+                    <a:p>
+                      <a:pPr marL="0" marR="0" indent="0" algn="l" defTabSz="914400" rtl="0" eaLnBrk="1" fontAlgn="auto" latinLnBrk="0" hangingPunct="1">
+                        <a:lnSpc>
+                          <a:spcPct val="100000"/>
+                        </a:lnSpc>
+                        <a:spcBef>
+                          <a:spcPts val="0"/>
+                        </a:spcBef>
+                        <a:spcAft>
+                          <a:spcPts val="0"/>
+                        </a:spcAft>
+                        <a:buClrTx/>
+                        <a:buSzTx/>
+                        <a:buFontTx/>
+                        <a:buNone/>
+                        <a:tabLst/>
+                        <a:defRPr/>
+                      </a:pPr>
+                      <a:r>
+                        <a:rPr lang="en-US" dirty="0" smtClean="0"/>
+                        <a:t>Birthday</a:t>
                       </a:r>
                       <a:endParaRPr lang="ru-RU" dirty="0" smtClean="0"/>
                     </a:p>
@@ -8921,14 +9077,14 @@
           <p:nvPr>
             <p:extLst>
               <p:ext uri="{D42A27DB-BD31-4B8C-83A1-F6EECF244321}">
-                <p14:modId xmlns:p14="http://schemas.microsoft.com/office/powerpoint/2010/main" val="2512765844"/>
+                <p14:modId xmlns:p14="http://schemas.microsoft.com/office/powerpoint/2010/main" val="730770487"/>
               </p:ext>
             </p:extLst>
           </p:nvPr>
         </p:nvGraphicFramePr>
         <p:xfrm>
-          <a:off x="2631440" y="1552786"/>
-          <a:ext cx="3169920" cy="2634408"/>
+          <a:off x="2692400" y="1552786"/>
+          <a:ext cx="3789680" cy="2634408"/>
         </p:xfrm>
         <a:graphic>
           <a:graphicData uri="http://schemas.openxmlformats.org/drawingml/2006/table">
@@ -8937,8 +9093,8 @@
                 <a:tableStyleId>{5C22544A-7EE6-4342-B048-85BDC9FD1C3A}</a:tableStyleId>
               </a:tblPr>
               <a:tblGrid>
-                <a:gridCol w="1574800"/>
-                <a:gridCol w="1595120"/>
+                <a:gridCol w="1882694"/>
+                <a:gridCol w="1906986"/>
               </a:tblGrid>
               <a:tr h="376344">
                 <a:tc>
@@ -8956,7 +9112,11 @@
                     <a:bodyPr/>
                     <a:lstStyle/>
                     <a:p>
-                      <a:endParaRPr lang="ru-RU"/>
+                      <a:r>
+                        <a:rPr lang="en-US" dirty="0" smtClean="0"/>
+                        <a:t>Category</a:t>
+                      </a:r>
+                      <a:endParaRPr lang="ru-RU" dirty="0"/>
                     </a:p>
                   </a:txBody>
                   <a:tcPr/>
@@ -9027,7 +9187,19 @@
                       </a:pPr>
                       <a:r>
                         <a:rPr lang="en-US" dirty="0" smtClean="0"/>
-                        <a:t>Teapot</a:t>
+                        <a:t>Tea</a:t>
+                      </a:r>
+                      <a:r>
+                        <a:rPr lang="en-US" baseline="0" dirty="0" smtClean="0"/>
+                        <a:t> </a:t>
+                      </a:r>
+                      <a:r>
+                        <a:rPr lang="en-US" baseline="0" dirty="0" err="1" smtClean="0"/>
+                        <a:t>Acsessories</a:t>
+                      </a:r>
+                      <a:r>
+                        <a:rPr lang="en-US" baseline="0" dirty="0" smtClean="0"/>
+                        <a:t> </a:t>
                       </a:r>
                       <a:endParaRPr lang="ru-RU" dirty="0" smtClean="0"/>
                     </a:p>
@@ -9093,10 +9265,6 @@
                     <a:bodyPr/>
                     <a:lstStyle/>
                     <a:p>
-                      <a:r>
-                        <a:rPr lang="en-US" dirty="0" smtClean="0"/>
-                        <a:t>Likes</a:t>
-                      </a:r>
                       <a:endParaRPr lang="ru-RU" dirty="0"/>
                     </a:p>
                   </a:txBody>
@@ -9119,10 +9287,6 @@
                     <a:bodyPr/>
                     <a:lstStyle/>
                     <a:p>
-                      <a:r>
-                        <a:rPr lang="en-US" dirty="0" smtClean="0"/>
-                        <a:t>Ingredients</a:t>
-                      </a:r>
                       <a:endParaRPr lang="ru-RU" dirty="0"/>
                     </a:p>
                   </a:txBody>
@@ -9152,14 +9316,14 @@
           <p:nvPr>
             <p:extLst>
               <p:ext uri="{D42A27DB-BD31-4B8C-83A1-F6EECF244321}">
-                <p14:modId xmlns:p14="http://schemas.microsoft.com/office/powerpoint/2010/main" val="1082951201"/>
+                <p14:modId xmlns:p14="http://schemas.microsoft.com/office/powerpoint/2010/main" val="957130758"/>
               </p:ext>
             </p:extLst>
           </p:nvPr>
         </p:nvGraphicFramePr>
         <p:xfrm>
-          <a:off x="5872480" y="1552786"/>
-          <a:ext cx="3982720" cy="1881720"/>
+          <a:off x="6675120" y="1513840"/>
+          <a:ext cx="2915920" cy="1871136"/>
         </p:xfrm>
         <a:graphic>
           <a:graphicData uri="http://schemas.openxmlformats.org/drawingml/2006/table">
@@ -9168,10 +9332,10 @@
                 <a:tableStyleId>{5C22544A-7EE6-4342-B048-85BDC9FD1C3A}</a:tableStyleId>
               </a:tblPr>
               <a:tblGrid>
-                <a:gridCol w="1929130"/>
-                <a:gridCol w="2053590"/>
+                <a:gridCol w="955881"/>
+                <a:gridCol w="1960039"/>
               </a:tblGrid>
-              <a:tr h="376344">
+              <a:tr h="283210">
                 <a:tc>
                   <a:txBody>
                     <a:bodyPr/>
@@ -9187,7 +9351,11 @@
                     <a:bodyPr/>
                     <a:lstStyle/>
                     <a:p>
-                      <a:endParaRPr lang="ru-RU"/>
+                      <a:r>
+                        <a:rPr lang="en-US" dirty="0" err="1" smtClean="0"/>
+                        <a:t>subCategory</a:t>
+                      </a:r>
+                      <a:endParaRPr lang="ru-RU" dirty="0"/>
                     </a:p>
                   </a:txBody>
                   <a:tcPr/>
@@ -9240,12 +9408,8 @@
                     <a:lstStyle/>
                     <a:p>
                       <a:r>
-                        <a:rPr lang="en-US" dirty="0" err="1" smtClean="0"/>
-                        <a:t>Chiana</a:t>
-                      </a:r>
-                      <a:r>
                         <a:rPr lang="en-US" dirty="0" smtClean="0"/>
-                        <a:t>/Taiwan</a:t>
+                        <a:t>China/Taiwan</a:t>
                       </a:r>
                       <a:r>
                         <a:rPr lang="en-US" baseline="0" dirty="0" smtClean="0"/>
@@ -9322,14 +9486,14 @@
           <p:nvPr>
             <p:extLst>
               <p:ext uri="{D42A27DB-BD31-4B8C-83A1-F6EECF244321}">
-                <p14:modId xmlns:p14="http://schemas.microsoft.com/office/powerpoint/2010/main" val="4235473816"/>
+                <p14:modId xmlns:p14="http://schemas.microsoft.com/office/powerpoint/2010/main" val="2100635138"/>
               </p:ext>
             </p:extLst>
           </p:nvPr>
         </p:nvGraphicFramePr>
         <p:xfrm>
-          <a:off x="8773160" y="3593465"/>
-          <a:ext cx="3251200" cy="1881720"/>
+          <a:off x="8793480" y="3680249"/>
+          <a:ext cx="3251200" cy="1860552"/>
         </p:xfrm>
         <a:graphic>
           <a:graphicData uri="http://schemas.openxmlformats.org/drawingml/2006/table">
@@ -9341,7 +9505,7 @@
                 <a:gridCol w="1574800"/>
                 <a:gridCol w="1676400"/>
               </a:tblGrid>
-              <a:tr h="376344">
+              <a:tr h="0">
                 <a:tc>
                   <a:txBody>
                     <a:bodyPr/>
@@ -9357,13 +9521,17 @@
                     <a:bodyPr/>
                     <a:lstStyle/>
                     <a:p>
+                      <a:r>
+                        <a:rPr lang="en-US" dirty="0" smtClean="0"/>
+                        <a:t>Ingredients</a:t>
+                      </a:r>
                       <a:endParaRPr lang="ru-RU" dirty="0"/>
                     </a:p>
                   </a:txBody>
                   <a:tcPr/>
                 </a:tc>
               </a:tr>
-              <a:tr h="376344">
+              <a:tr h="139911">
                 <a:tc>
                   <a:txBody>
                     <a:bodyPr/>
@@ -9465,6 +9633,116 @@
                         <a:rPr lang="en-US" dirty="0" smtClean="0"/>
                         <a:t>Black Tea</a:t>
                       </a:r>
+                      <a:endParaRPr lang="ru-RU" dirty="0"/>
+                    </a:p>
+                  </a:txBody>
+                  <a:tcPr/>
+                </a:tc>
+              </a:tr>
+            </a:tbl>
+          </a:graphicData>
+        </a:graphic>
+      </p:graphicFrame>
+      <p:graphicFrame>
+        <p:nvGraphicFramePr>
+          <p:cNvPr id="10" name="Таблица 9"/>
+          <p:cNvGraphicFramePr>
+            <a:graphicFrameLocks noGrp="1"/>
+          </p:cNvGraphicFramePr>
+          <p:nvPr>
+            <p:extLst>
+              <p:ext uri="{D42A27DB-BD31-4B8C-83A1-F6EECF244321}">
+                <p14:modId xmlns:p14="http://schemas.microsoft.com/office/powerpoint/2010/main" val="1292580939"/>
+              </p:ext>
+            </p:extLst>
+          </p:nvPr>
+        </p:nvGraphicFramePr>
+        <p:xfrm>
+          <a:off x="980440" y="5269865"/>
+          <a:ext cx="3251200" cy="1129032"/>
+        </p:xfrm>
+        <a:graphic>
+          <a:graphicData uri="http://schemas.openxmlformats.org/drawingml/2006/table">
+            <a:tbl>
+              <a:tblPr firstRow="1" bandRow="1">
+                <a:tableStyleId>{5C22544A-7EE6-4342-B048-85BDC9FD1C3A}</a:tableStyleId>
+              </a:tblPr>
+              <a:tblGrid>
+                <a:gridCol w="1574800"/>
+                <a:gridCol w="1676400"/>
+              </a:tblGrid>
+              <a:tr h="376344">
+                <a:tc>
+                  <a:txBody>
+                    <a:bodyPr/>
+                    <a:lstStyle/>
+                    <a:p>
+                      <a:r>
+                        <a:rPr lang="en-US" dirty="0" smtClean="0"/>
+                        <a:t>Likes</a:t>
+                      </a:r>
+                      <a:endParaRPr lang="ru-RU" dirty="0"/>
+                    </a:p>
+                  </a:txBody>
+                  <a:tcPr/>
+                </a:tc>
+                <a:tc>
+                  <a:txBody>
+                    <a:bodyPr/>
+                    <a:lstStyle/>
+                    <a:p>
+                      <a:endParaRPr lang="ru-RU" dirty="0"/>
+                    </a:p>
+                  </a:txBody>
+                  <a:tcPr/>
+                </a:tc>
+              </a:tr>
+              <a:tr h="376344">
+                <a:tc>
+                  <a:txBody>
+                    <a:bodyPr/>
+                    <a:lstStyle/>
+                    <a:p>
+                      <a:r>
+                        <a:rPr lang="en-US" dirty="0" smtClean="0"/>
+                        <a:t>Ingredients</a:t>
+                      </a:r>
+                      <a:endParaRPr lang="ru-RU" dirty="0"/>
+                    </a:p>
+                  </a:txBody>
+                  <a:tcPr/>
+                </a:tc>
+                <a:tc>
+                  <a:txBody>
+                    <a:bodyPr/>
+                    <a:lstStyle/>
+                    <a:p>
+                      <a:endParaRPr lang="ru-RU" dirty="0"/>
+                    </a:p>
+                  </a:txBody>
+                  <a:tcPr/>
+                </a:tc>
+              </a:tr>
+              <a:tr h="376344">
+                <a:tc>
+                  <a:txBody>
+                    <a:bodyPr/>
+                    <a:lstStyle/>
+                    <a:p>
+                      <a:r>
+                        <a:rPr lang="en-US" dirty="0" smtClean="0"/>
+                        <a:t>Categories</a:t>
+                      </a:r>
+                      <a:endParaRPr lang="ru-RU" dirty="0"/>
+                    </a:p>
+                  </a:txBody>
+                  <a:tcPr/>
+                </a:tc>
+                <a:tc>
+                  <a:txBody>
+                    <a:bodyPr/>
+                    <a:lstStyle/>
+                    <a:p>
                       <a:endParaRPr lang="ru-RU" dirty="0"/>
                     </a:p>
                   </a:txBody>

</xml_diff>